<commit_message>
Updated based on Burt's comments
</commit_message>
<xml_diff>
--- a/Trunk/Hands On/DCAF Hands On 2016/Diagrams/Temperature Controller Diagrams.pptx
+++ b/Trunk/Hands On/DCAF Hands On 2016/Diagrams/Temperature Controller Diagrams.pptx
@@ -7,6 +7,8 @@
   <p:sldIdLst>
     <p:sldId id="256" r:id="rId2"/>
     <p:sldId id="257" r:id="rId3"/>
+    <p:sldId id="259" r:id="rId4"/>
+    <p:sldId id="260" r:id="rId5"/>
   </p:sldIdLst>
   <p:sldSz cx="12192000" cy="6858000"/>
   <p:notesSz cx="6858000" cy="9144000"/>
@@ -105,6 +107,11 @@
       </a:defRPr>
     </a:lvl9pPr>
   </p:defaultTextStyle>
+  <p:extLst>
+    <p:ext uri="{EFAFB233-063F-42B5-8137-9DF3F51BA10A}">
+      <p15:sldGuideLst xmlns:p15="http://schemas.microsoft.com/office/powerpoint/2012/main"/>
+    </p:ext>
+  </p:extLst>
 </p:presentation>
 </file>
 
@@ -239,7 +246,7 @@
           <a:p>
             <a:fld id="{E6D31BC1-449C-4735-AB6A-F524DFDD7959}" type="datetimeFigureOut">
               <a:rPr lang="en-US" smtClean="0"/>
-              <a:t>6/10/2016</a:t>
+              <a:t>7/20/2016</a:t>
             </a:fld>
             <a:endParaRPr lang="en-US"/>
           </a:p>
@@ -409,7 +416,7 @@
           <a:p>
             <a:fld id="{E6D31BC1-449C-4735-AB6A-F524DFDD7959}" type="datetimeFigureOut">
               <a:rPr lang="en-US" smtClean="0"/>
-              <a:t>6/10/2016</a:t>
+              <a:t>7/20/2016</a:t>
             </a:fld>
             <a:endParaRPr lang="en-US"/>
           </a:p>
@@ -589,7 +596,7 @@
           <a:p>
             <a:fld id="{E6D31BC1-449C-4735-AB6A-F524DFDD7959}" type="datetimeFigureOut">
               <a:rPr lang="en-US" smtClean="0"/>
-              <a:t>6/10/2016</a:t>
+              <a:t>7/20/2016</a:t>
             </a:fld>
             <a:endParaRPr lang="en-US"/>
           </a:p>
@@ -759,7 +766,7 @@
           <a:p>
             <a:fld id="{E6D31BC1-449C-4735-AB6A-F524DFDD7959}" type="datetimeFigureOut">
               <a:rPr lang="en-US" smtClean="0"/>
-              <a:t>6/10/2016</a:t>
+              <a:t>7/20/2016</a:t>
             </a:fld>
             <a:endParaRPr lang="en-US"/>
           </a:p>
@@ -1005,7 +1012,7 @@
           <a:p>
             <a:fld id="{E6D31BC1-449C-4735-AB6A-F524DFDD7959}" type="datetimeFigureOut">
               <a:rPr lang="en-US" smtClean="0"/>
-              <a:t>6/10/2016</a:t>
+              <a:t>7/20/2016</a:t>
             </a:fld>
             <a:endParaRPr lang="en-US"/>
           </a:p>
@@ -1237,7 +1244,7 @@
           <a:p>
             <a:fld id="{E6D31BC1-449C-4735-AB6A-F524DFDD7959}" type="datetimeFigureOut">
               <a:rPr lang="en-US" smtClean="0"/>
-              <a:t>6/10/2016</a:t>
+              <a:t>7/20/2016</a:t>
             </a:fld>
             <a:endParaRPr lang="en-US"/>
           </a:p>
@@ -1604,7 +1611,7 @@
           <a:p>
             <a:fld id="{E6D31BC1-449C-4735-AB6A-F524DFDD7959}" type="datetimeFigureOut">
               <a:rPr lang="en-US" smtClean="0"/>
-              <a:t>6/10/2016</a:t>
+              <a:t>7/20/2016</a:t>
             </a:fld>
             <a:endParaRPr lang="en-US"/>
           </a:p>
@@ -1722,7 +1729,7 @@
           <a:p>
             <a:fld id="{E6D31BC1-449C-4735-AB6A-F524DFDD7959}" type="datetimeFigureOut">
               <a:rPr lang="en-US" smtClean="0"/>
-              <a:t>6/10/2016</a:t>
+              <a:t>7/20/2016</a:t>
             </a:fld>
             <a:endParaRPr lang="en-US"/>
           </a:p>
@@ -1817,7 +1824,7 @@
           <a:p>
             <a:fld id="{E6D31BC1-449C-4735-AB6A-F524DFDD7959}" type="datetimeFigureOut">
               <a:rPr lang="en-US" smtClean="0"/>
-              <a:t>6/10/2016</a:t>
+              <a:t>7/20/2016</a:t>
             </a:fld>
             <a:endParaRPr lang="en-US"/>
           </a:p>
@@ -2094,7 +2101,7 @@
           <a:p>
             <a:fld id="{E6D31BC1-449C-4735-AB6A-F524DFDD7959}" type="datetimeFigureOut">
               <a:rPr lang="en-US" smtClean="0"/>
-              <a:t>6/10/2016</a:t>
+              <a:t>7/20/2016</a:t>
             </a:fld>
             <a:endParaRPr lang="en-US"/>
           </a:p>
@@ -2347,7 +2354,7 @@
           <a:p>
             <a:fld id="{E6D31BC1-449C-4735-AB6A-F524DFDD7959}" type="datetimeFigureOut">
               <a:rPr lang="en-US" smtClean="0"/>
-              <a:t>6/10/2016</a:t>
+              <a:t>7/20/2016</a:t>
             </a:fld>
             <a:endParaRPr lang="en-US"/>
           </a:p>
@@ -2560,7 +2567,7 @@
           <a:p>
             <a:fld id="{E6D31BC1-449C-4735-AB6A-F524DFDD7959}" type="datetimeFigureOut">
               <a:rPr lang="en-US" smtClean="0"/>
-              <a:t>6/10/2016</a:t>
+              <a:t>7/20/2016</a:t>
             </a:fld>
             <a:endParaRPr lang="en-US"/>
           </a:p>
@@ -6102,6 +6109,812 @@
 </p:sld>
 </file>
 
+<file path=ppt/slides/slide3.xml><?xml version="1.0" encoding="utf-8"?>
+<p:sld xmlns:a="http://schemas.openxmlformats.org/drawingml/2006/main" xmlns:r="http://schemas.openxmlformats.org/officeDocument/2006/relationships" xmlns:p="http://schemas.openxmlformats.org/presentationml/2006/main">
+  <p:cSld>
+    <p:spTree>
+      <p:nvGrpSpPr>
+        <p:cNvPr id="1" name=""/>
+        <p:cNvGrpSpPr/>
+        <p:nvPr/>
+      </p:nvGrpSpPr>
+      <p:grpSpPr>
+        <a:xfrm>
+          <a:off x="0" y="0"/>
+          <a:ext cx="0" cy="0"/>
+          <a:chOff x="0" y="0"/>
+          <a:chExt cx="0" cy="0"/>
+        </a:xfrm>
+      </p:grpSpPr>
+      <p:pic>
+        <p:nvPicPr>
+          <p:cNvPr id="4" name="Imagen 3"/>
+          <p:cNvPicPr>
+            <a:picLocks noChangeAspect="1"/>
+          </p:cNvPicPr>
+          <p:nvPr/>
+        </p:nvPicPr>
+        <p:blipFill>
+          <a:blip r:embed="rId2"/>
+          <a:stretch>
+            <a:fillRect/>
+          </a:stretch>
+        </p:blipFill>
+        <p:spPr>
+          <a:xfrm>
+            <a:off x="2754981" y="915402"/>
+            <a:ext cx="6200775" cy="2171700"/>
+          </a:xfrm>
+          <a:prstGeom prst="rect">
+            <a:avLst/>
+          </a:prstGeom>
+        </p:spPr>
+      </p:pic>
+      <p:sp>
+        <p:nvSpPr>
+          <p:cNvPr id="11" name="CuadroTexto 10"/>
+          <p:cNvSpPr txBox="1"/>
+          <p:nvPr/>
+        </p:nvSpPr>
+        <p:spPr>
+          <a:xfrm>
+            <a:off x="5284313" y="405385"/>
+            <a:ext cx="1109599" cy="369332"/>
+          </a:xfrm>
+          <a:prstGeom prst="rect">
+            <a:avLst/>
+          </a:prstGeom>
+          <a:noFill/>
+        </p:spPr>
+        <p:txBody>
+          <a:bodyPr wrap="none" rtlCol="0">
+            <a:spAutoFit/>
+          </a:bodyPr>
+          <a:lstStyle/>
+          <a:p>
+            <a:r>
+              <a:rPr lang="en-US" dirty="0" smtClean="0">
+                <a:solidFill>
+                  <a:srgbClr val="00B050"/>
+                </a:solidFill>
+              </a:rPr>
+              <a:t>Mappings</a:t>
+            </a:r>
+            <a:endParaRPr lang="en-US" dirty="0">
+              <a:solidFill>
+                <a:srgbClr val="00B050"/>
+              </a:solidFill>
+            </a:endParaRPr>
+          </a:p>
+        </p:txBody>
+      </p:sp>
+      <p:cxnSp>
+        <p:nvCxnSpPr>
+          <p:cNvPr id="13" name="Conector recto de flecha 12"/>
+          <p:cNvCxnSpPr>
+            <a:stCxn id="11" idx="1"/>
+          </p:cNvCxnSpPr>
+          <p:nvPr/>
+        </p:nvCxnSpPr>
+        <p:spPr>
+          <a:xfrm flipH="1">
+            <a:off x="5005691" y="590051"/>
+            <a:ext cx="278622" cy="1060767"/>
+          </a:xfrm>
+          <a:prstGeom prst="straightConnector1">
+            <a:avLst/>
+          </a:prstGeom>
+          <a:ln>
+            <a:tailEnd type="triangle"/>
+          </a:ln>
+        </p:spPr>
+        <p:style>
+          <a:lnRef idx="1">
+            <a:schemeClr val="accent1"/>
+          </a:lnRef>
+          <a:fillRef idx="0">
+            <a:schemeClr val="accent1"/>
+          </a:fillRef>
+          <a:effectRef idx="0">
+            <a:schemeClr val="accent1"/>
+          </a:effectRef>
+          <a:fontRef idx="minor">
+            <a:schemeClr val="tx1"/>
+          </a:fontRef>
+        </p:style>
+      </p:cxnSp>
+      <p:cxnSp>
+        <p:nvCxnSpPr>
+          <p:cNvPr id="14" name="Conector recto de flecha 13"/>
+          <p:cNvCxnSpPr>
+            <a:stCxn id="11" idx="3"/>
+          </p:cNvCxnSpPr>
+          <p:nvPr/>
+        </p:nvCxnSpPr>
+        <p:spPr>
+          <a:xfrm>
+            <a:off x="6393912" y="590051"/>
+            <a:ext cx="337785" cy="1239575"/>
+          </a:xfrm>
+          <a:prstGeom prst="straightConnector1">
+            <a:avLst/>
+          </a:prstGeom>
+          <a:ln>
+            <a:tailEnd type="triangle"/>
+          </a:ln>
+        </p:spPr>
+        <p:style>
+          <a:lnRef idx="1">
+            <a:schemeClr val="accent1"/>
+          </a:lnRef>
+          <a:fillRef idx="0">
+            <a:schemeClr val="accent1"/>
+          </a:fillRef>
+          <a:effectRef idx="0">
+            <a:schemeClr val="accent1"/>
+          </a:effectRef>
+          <a:fontRef idx="minor">
+            <a:schemeClr val="tx1"/>
+          </a:fontRef>
+        </p:style>
+      </p:cxnSp>
+      <p:sp>
+        <p:nvSpPr>
+          <p:cNvPr id="19" name="CuadroTexto 18"/>
+          <p:cNvSpPr txBox="1"/>
+          <p:nvPr/>
+        </p:nvSpPr>
+        <p:spPr>
+          <a:xfrm>
+            <a:off x="3492826" y="3268257"/>
+            <a:ext cx="588238" cy="369332"/>
+          </a:xfrm>
+          <a:prstGeom prst="rect">
+            <a:avLst/>
+          </a:prstGeom>
+          <a:noFill/>
+        </p:spPr>
+        <p:txBody>
+          <a:bodyPr wrap="none" rtlCol="0">
+            <a:spAutoFit/>
+          </a:bodyPr>
+          <a:lstStyle/>
+          <a:p>
+            <a:r>
+              <a:rPr lang="en-US" dirty="0" smtClean="0">
+                <a:solidFill>
+                  <a:srgbClr val="00B050"/>
+                </a:solidFill>
+              </a:rPr>
+              <a:t>Tags</a:t>
+            </a:r>
+            <a:endParaRPr lang="en-US" dirty="0">
+              <a:solidFill>
+                <a:srgbClr val="00B050"/>
+              </a:solidFill>
+            </a:endParaRPr>
+          </a:p>
+        </p:txBody>
+      </p:sp>
+      <p:cxnSp>
+        <p:nvCxnSpPr>
+          <p:cNvPr id="20" name="Conector recto de flecha 19"/>
+          <p:cNvCxnSpPr>
+            <a:stCxn id="19" idx="3"/>
+          </p:cNvCxnSpPr>
+          <p:nvPr/>
+        </p:nvCxnSpPr>
+        <p:spPr>
+          <a:xfrm flipV="1">
+            <a:off x="4081064" y="2057948"/>
+            <a:ext cx="1379865" cy="1394975"/>
+          </a:xfrm>
+          <a:prstGeom prst="straightConnector1">
+            <a:avLst/>
+          </a:prstGeom>
+          <a:ln>
+            <a:tailEnd type="triangle"/>
+          </a:ln>
+        </p:spPr>
+        <p:style>
+          <a:lnRef idx="1">
+            <a:schemeClr val="accent1"/>
+          </a:lnRef>
+          <a:fillRef idx="0">
+            <a:schemeClr val="accent1"/>
+          </a:fillRef>
+          <a:effectRef idx="0">
+            <a:schemeClr val="accent1"/>
+          </a:effectRef>
+          <a:fontRef idx="minor">
+            <a:schemeClr val="tx1"/>
+          </a:fontRef>
+        </p:style>
+      </p:cxnSp>
+      <p:cxnSp>
+        <p:nvCxnSpPr>
+          <p:cNvPr id="23" name="Conector recto de flecha 22"/>
+          <p:cNvCxnSpPr>
+            <a:stCxn id="19" idx="3"/>
+          </p:cNvCxnSpPr>
+          <p:nvPr/>
+        </p:nvCxnSpPr>
+        <p:spPr>
+          <a:xfrm flipV="1">
+            <a:off x="4081064" y="1925418"/>
+            <a:ext cx="1375289" cy="1527505"/>
+          </a:xfrm>
+          <a:prstGeom prst="straightConnector1">
+            <a:avLst/>
+          </a:prstGeom>
+          <a:ln>
+            <a:tailEnd type="triangle"/>
+          </a:ln>
+        </p:spPr>
+        <p:style>
+          <a:lnRef idx="1">
+            <a:schemeClr val="accent1"/>
+          </a:lnRef>
+          <a:fillRef idx="0">
+            <a:schemeClr val="accent1"/>
+          </a:fillRef>
+          <a:effectRef idx="0">
+            <a:schemeClr val="accent1"/>
+          </a:effectRef>
+          <a:fontRef idx="minor">
+            <a:schemeClr val="tx1"/>
+          </a:fontRef>
+        </p:style>
+      </p:cxnSp>
+      <p:cxnSp>
+        <p:nvCxnSpPr>
+          <p:cNvPr id="26" name="Conector recto de flecha 25"/>
+          <p:cNvCxnSpPr>
+            <a:stCxn id="19" idx="3"/>
+          </p:cNvCxnSpPr>
+          <p:nvPr/>
+        </p:nvCxnSpPr>
+        <p:spPr>
+          <a:xfrm flipV="1">
+            <a:off x="4081064" y="1762310"/>
+            <a:ext cx="1375289" cy="1690613"/>
+          </a:xfrm>
+          <a:prstGeom prst="straightConnector1">
+            <a:avLst/>
+          </a:prstGeom>
+          <a:ln>
+            <a:tailEnd type="triangle"/>
+          </a:ln>
+        </p:spPr>
+        <p:style>
+          <a:lnRef idx="1">
+            <a:schemeClr val="accent1"/>
+          </a:lnRef>
+          <a:fillRef idx="0">
+            <a:schemeClr val="accent1"/>
+          </a:fillRef>
+          <a:effectRef idx="0">
+            <a:schemeClr val="accent1"/>
+          </a:effectRef>
+          <a:fontRef idx="minor">
+            <a:schemeClr val="tx1"/>
+          </a:fontRef>
+        </p:style>
+      </p:cxnSp>
+      <p:sp>
+        <p:nvSpPr>
+          <p:cNvPr id="29" name="CuadroTexto 28"/>
+          <p:cNvSpPr txBox="1"/>
+          <p:nvPr/>
+        </p:nvSpPr>
+        <p:spPr>
+          <a:xfrm>
+            <a:off x="5335291" y="3268257"/>
+            <a:ext cx="1042273" cy="369332"/>
+          </a:xfrm>
+          <a:prstGeom prst="rect">
+            <a:avLst/>
+          </a:prstGeom>
+          <a:noFill/>
+        </p:spPr>
+        <p:txBody>
+          <a:bodyPr wrap="none" rtlCol="0">
+            <a:spAutoFit/>
+          </a:bodyPr>
+          <a:lstStyle/>
+          <a:p>
+            <a:r>
+              <a:rPr lang="en-US" dirty="0" smtClean="0">
+                <a:solidFill>
+                  <a:srgbClr val="00B050"/>
+                </a:solidFill>
+              </a:rPr>
+              <a:t>Channels</a:t>
+            </a:r>
+            <a:endParaRPr lang="en-US" dirty="0">
+              <a:solidFill>
+                <a:srgbClr val="00B050"/>
+              </a:solidFill>
+            </a:endParaRPr>
+          </a:p>
+        </p:txBody>
+      </p:sp>
+      <p:cxnSp>
+        <p:nvCxnSpPr>
+          <p:cNvPr id="30" name="Conector recto de flecha 29"/>
+          <p:cNvCxnSpPr>
+            <a:stCxn id="29" idx="0"/>
+          </p:cNvCxnSpPr>
+          <p:nvPr/>
+        </p:nvCxnSpPr>
+        <p:spPr>
+          <a:xfrm flipV="1">
+            <a:off x="5856428" y="2600828"/>
+            <a:ext cx="1100579" cy="667429"/>
+          </a:xfrm>
+          <a:prstGeom prst="straightConnector1">
+            <a:avLst/>
+          </a:prstGeom>
+          <a:ln>
+            <a:tailEnd type="triangle"/>
+          </a:ln>
+        </p:spPr>
+        <p:style>
+          <a:lnRef idx="1">
+            <a:schemeClr val="accent1"/>
+          </a:lnRef>
+          <a:fillRef idx="0">
+            <a:schemeClr val="accent1"/>
+          </a:fillRef>
+          <a:effectRef idx="0">
+            <a:schemeClr val="accent1"/>
+          </a:effectRef>
+          <a:fontRef idx="minor">
+            <a:schemeClr val="tx1"/>
+          </a:fontRef>
+        </p:style>
+      </p:cxnSp>
+      <p:cxnSp>
+        <p:nvCxnSpPr>
+          <p:cNvPr id="34" name="Conector recto de flecha 33"/>
+          <p:cNvCxnSpPr>
+            <a:stCxn id="29" idx="0"/>
+          </p:cNvCxnSpPr>
+          <p:nvPr/>
+        </p:nvCxnSpPr>
+        <p:spPr>
+          <a:xfrm flipV="1">
+            <a:off x="5856428" y="2486870"/>
+            <a:ext cx="1100579" cy="781387"/>
+          </a:xfrm>
+          <a:prstGeom prst="straightConnector1">
+            <a:avLst/>
+          </a:prstGeom>
+          <a:ln>
+            <a:tailEnd type="triangle"/>
+          </a:ln>
+        </p:spPr>
+        <p:style>
+          <a:lnRef idx="1">
+            <a:schemeClr val="accent1"/>
+          </a:lnRef>
+          <a:fillRef idx="0">
+            <a:schemeClr val="accent1"/>
+          </a:fillRef>
+          <a:effectRef idx="0">
+            <a:schemeClr val="accent1"/>
+          </a:effectRef>
+          <a:fontRef idx="minor">
+            <a:schemeClr val="tx1"/>
+          </a:fontRef>
+        </p:style>
+      </p:cxnSp>
+      <p:cxnSp>
+        <p:nvCxnSpPr>
+          <p:cNvPr id="39" name="Conector recto de flecha 38"/>
+          <p:cNvCxnSpPr>
+            <a:stCxn id="29" idx="0"/>
+          </p:cNvCxnSpPr>
+          <p:nvPr/>
+        </p:nvCxnSpPr>
+        <p:spPr>
+          <a:xfrm flipV="1">
+            <a:off x="5856428" y="2308062"/>
+            <a:ext cx="1154715" cy="960195"/>
+          </a:xfrm>
+          <a:prstGeom prst="straightConnector1">
+            <a:avLst/>
+          </a:prstGeom>
+          <a:ln>
+            <a:tailEnd type="triangle"/>
+          </a:ln>
+        </p:spPr>
+        <p:style>
+          <a:lnRef idx="1">
+            <a:schemeClr val="accent1"/>
+          </a:lnRef>
+          <a:fillRef idx="0">
+            <a:schemeClr val="accent1"/>
+          </a:fillRef>
+          <a:effectRef idx="0">
+            <a:schemeClr val="accent1"/>
+          </a:effectRef>
+          <a:fontRef idx="minor">
+            <a:schemeClr val="tx1"/>
+          </a:fontRef>
+        </p:style>
+      </p:cxnSp>
+      <p:cxnSp>
+        <p:nvCxnSpPr>
+          <p:cNvPr id="41" name="Conector recto de flecha 40"/>
+          <p:cNvCxnSpPr>
+            <a:stCxn id="29" idx="0"/>
+          </p:cNvCxnSpPr>
+          <p:nvPr/>
+        </p:nvCxnSpPr>
+        <p:spPr>
+          <a:xfrm flipH="1" flipV="1">
+            <a:off x="3752666" y="1791206"/>
+            <a:ext cx="2103762" cy="1477051"/>
+          </a:xfrm>
+          <a:prstGeom prst="straightConnector1">
+            <a:avLst/>
+          </a:prstGeom>
+          <a:ln>
+            <a:tailEnd type="triangle"/>
+          </a:ln>
+        </p:spPr>
+        <p:style>
+          <a:lnRef idx="1">
+            <a:schemeClr val="accent1"/>
+          </a:lnRef>
+          <a:fillRef idx="0">
+            <a:schemeClr val="accent1"/>
+          </a:fillRef>
+          <a:effectRef idx="0">
+            <a:schemeClr val="accent1"/>
+          </a:effectRef>
+          <a:fontRef idx="minor">
+            <a:schemeClr val="tx1"/>
+          </a:fontRef>
+        </p:style>
+      </p:cxnSp>
+      <p:cxnSp>
+        <p:nvCxnSpPr>
+          <p:cNvPr id="44" name="Conector recto de flecha 43"/>
+          <p:cNvCxnSpPr>
+            <a:stCxn id="29" idx="0"/>
+          </p:cNvCxnSpPr>
+          <p:nvPr/>
+        </p:nvCxnSpPr>
+        <p:spPr>
+          <a:xfrm flipH="1" flipV="1">
+            <a:off x="3752666" y="1922048"/>
+            <a:ext cx="2103762" cy="1346209"/>
+          </a:xfrm>
+          <a:prstGeom prst="straightConnector1">
+            <a:avLst/>
+          </a:prstGeom>
+          <a:ln>
+            <a:tailEnd type="triangle"/>
+          </a:ln>
+        </p:spPr>
+        <p:style>
+          <a:lnRef idx="1">
+            <a:schemeClr val="accent1"/>
+          </a:lnRef>
+          <a:fillRef idx="0">
+            <a:schemeClr val="accent1"/>
+          </a:fillRef>
+          <a:effectRef idx="0">
+            <a:schemeClr val="accent1"/>
+          </a:effectRef>
+          <a:fontRef idx="minor">
+            <a:schemeClr val="tx1"/>
+          </a:fontRef>
+        </p:style>
+      </p:cxnSp>
+      <p:cxnSp>
+        <p:nvCxnSpPr>
+          <p:cNvPr id="52" name="Conector recto de flecha 51"/>
+          <p:cNvCxnSpPr>
+            <a:stCxn id="11" idx="1"/>
+          </p:cNvCxnSpPr>
+          <p:nvPr/>
+        </p:nvCxnSpPr>
+        <p:spPr>
+          <a:xfrm flipH="1">
+            <a:off x="5083456" y="590051"/>
+            <a:ext cx="200857" cy="1154212"/>
+          </a:xfrm>
+          <a:prstGeom prst="straightConnector1">
+            <a:avLst/>
+          </a:prstGeom>
+          <a:ln>
+            <a:tailEnd type="triangle"/>
+          </a:ln>
+        </p:spPr>
+        <p:style>
+          <a:lnRef idx="1">
+            <a:schemeClr val="accent1"/>
+          </a:lnRef>
+          <a:fillRef idx="0">
+            <a:schemeClr val="accent1"/>
+          </a:fillRef>
+          <a:effectRef idx="0">
+            <a:schemeClr val="accent1"/>
+          </a:effectRef>
+          <a:fontRef idx="minor">
+            <a:schemeClr val="tx1"/>
+          </a:fontRef>
+        </p:style>
+      </p:cxnSp>
+      <p:cxnSp>
+        <p:nvCxnSpPr>
+          <p:cNvPr id="54" name="Conector recto de flecha 53"/>
+          <p:cNvCxnSpPr>
+            <a:stCxn id="11" idx="3"/>
+          </p:cNvCxnSpPr>
+          <p:nvPr/>
+        </p:nvCxnSpPr>
+        <p:spPr>
+          <a:xfrm>
+            <a:off x="6393912" y="590051"/>
+            <a:ext cx="146043" cy="1060767"/>
+          </a:xfrm>
+          <a:prstGeom prst="straightConnector1">
+            <a:avLst/>
+          </a:prstGeom>
+          <a:ln>
+            <a:tailEnd type="triangle"/>
+          </a:ln>
+        </p:spPr>
+        <p:style>
+          <a:lnRef idx="1">
+            <a:schemeClr val="accent1"/>
+          </a:lnRef>
+          <a:fillRef idx="0">
+            <a:schemeClr val="accent1"/>
+          </a:fillRef>
+          <a:effectRef idx="0">
+            <a:schemeClr val="accent1"/>
+          </a:effectRef>
+          <a:fontRef idx="minor">
+            <a:schemeClr val="tx1"/>
+          </a:fontRef>
+        </p:style>
+      </p:cxnSp>
+      <p:sp>
+        <p:nvSpPr>
+          <p:cNvPr id="64" name="CuadroTexto 63"/>
+          <p:cNvSpPr txBox="1"/>
+          <p:nvPr/>
+        </p:nvSpPr>
+        <p:spPr>
+          <a:xfrm>
+            <a:off x="3424748" y="882597"/>
+            <a:ext cx="915635" cy="369332"/>
+          </a:xfrm>
+          <a:prstGeom prst="rect">
+            <a:avLst/>
+          </a:prstGeom>
+          <a:noFill/>
+        </p:spPr>
+        <p:txBody>
+          <a:bodyPr wrap="none" rtlCol="0">
+            <a:spAutoFit/>
+          </a:bodyPr>
+          <a:lstStyle/>
+          <a:p>
+            <a:r>
+              <a:rPr lang="en-US" dirty="0" smtClean="0">
+                <a:solidFill>
+                  <a:srgbClr val="0070C0"/>
+                </a:solidFill>
+              </a:rPr>
+              <a:t>Module</a:t>
+            </a:r>
+            <a:endParaRPr lang="en-US" dirty="0">
+              <a:solidFill>
+                <a:srgbClr val="0070C0"/>
+              </a:solidFill>
+            </a:endParaRPr>
+          </a:p>
+        </p:txBody>
+      </p:sp>
+      <p:sp>
+        <p:nvSpPr>
+          <p:cNvPr id="65" name="CuadroTexto 64"/>
+          <p:cNvSpPr txBox="1"/>
+          <p:nvPr/>
+        </p:nvSpPr>
+        <p:spPr>
+          <a:xfrm>
+            <a:off x="7397005" y="913915"/>
+            <a:ext cx="915635" cy="369332"/>
+          </a:xfrm>
+          <a:prstGeom prst="rect">
+            <a:avLst/>
+          </a:prstGeom>
+          <a:noFill/>
+        </p:spPr>
+        <p:txBody>
+          <a:bodyPr wrap="none" rtlCol="0">
+            <a:spAutoFit/>
+          </a:bodyPr>
+          <a:lstStyle/>
+          <a:p>
+            <a:r>
+              <a:rPr lang="en-US" dirty="0" smtClean="0">
+                <a:solidFill>
+                  <a:srgbClr val="0070C0"/>
+                </a:solidFill>
+              </a:rPr>
+              <a:t>Module</a:t>
+            </a:r>
+            <a:endParaRPr lang="en-US" dirty="0">
+              <a:solidFill>
+                <a:srgbClr val="0070C0"/>
+              </a:solidFill>
+            </a:endParaRPr>
+          </a:p>
+        </p:txBody>
+      </p:sp>
+      <p:sp>
+        <p:nvSpPr>
+          <p:cNvPr id="66" name="CuadroTexto 65"/>
+          <p:cNvSpPr txBox="1"/>
+          <p:nvPr/>
+        </p:nvSpPr>
+        <p:spPr>
+          <a:xfrm>
+            <a:off x="5421207" y="898730"/>
+            <a:ext cx="866199" cy="369332"/>
+          </a:xfrm>
+          <a:prstGeom prst="rect">
+            <a:avLst/>
+          </a:prstGeom>
+          <a:noFill/>
+        </p:spPr>
+        <p:txBody>
+          <a:bodyPr wrap="none" rtlCol="0">
+            <a:spAutoFit/>
+          </a:bodyPr>
+          <a:lstStyle/>
+          <a:p>
+            <a:r>
+              <a:rPr lang="en-US" dirty="0" smtClean="0">
+                <a:solidFill>
+                  <a:srgbClr val="0070C0"/>
+                </a:solidFill>
+              </a:rPr>
+              <a:t>Tag List</a:t>
+            </a:r>
+            <a:endParaRPr lang="en-US" dirty="0">
+              <a:solidFill>
+                <a:srgbClr val="0070C0"/>
+              </a:solidFill>
+            </a:endParaRPr>
+          </a:p>
+        </p:txBody>
+      </p:sp>
+    </p:spTree>
+    <p:extLst>
+      <p:ext uri="{BB962C8B-B14F-4D97-AF65-F5344CB8AC3E}">
+        <p14:creationId xmlns:p14="http://schemas.microsoft.com/office/powerpoint/2010/main" val="2634709745"/>
+      </p:ext>
+    </p:extLst>
+  </p:cSld>
+  <p:clrMapOvr>
+    <a:masterClrMapping/>
+  </p:clrMapOvr>
+  <p:timing>
+    <p:tnLst>
+      <p:par>
+        <p:cTn id="1" dur="indefinite" restart="never" nodeType="tmRoot"/>
+      </p:par>
+    </p:tnLst>
+  </p:timing>
+</p:sld>
+</file>
+
+<file path=ppt/slides/slide4.xml><?xml version="1.0" encoding="utf-8"?>
+<p:sld xmlns:a="http://schemas.openxmlformats.org/drawingml/2006/main" xmlns:r="http://schemas.openxmlformats.org/officeDocument/2006/relationships" xmlns:p="http://schemas.openxmlformats.org/presentationml/2006/main">
+  <p:cSld>
+    <p:spTree>
+      <p:nvGrpSpPr>
+        <p:cNvPr id="1" name=""/>
+        <p:cNvGrpSpPr/>
+        <p:nvPr/>
+      </p:nvGrpSpPr>
+      <p:grpSpPr>
+        <a:xfrm>
+          <a:off x="0" y="0"/>
+          <a:ext cx="0" cy="0"/>
+          <a:chOff x="0" y="0"/>
+          <a:chExt cx="0" cy="0"/>
+        </a:xfrm>
+      </p:grpSpPr>
+      <p:sp>
+        <p:nvSpPr>
+          <p:cNvPr id="2" name="Título 1"/>
+          <p:cNvSpPr>
+            <a:spLocks noGrp="1"/>
+          </p:cNvSpPr>
+          <p:nvPr>
+            <p:ph type="title"/>
+          </p:nvPr>
+        </p:nvSpPr>
+        <p:spPr/>
+        <p:txBody>
+          <a:bodyPr/>
+          <a:lstStyle/>
+          <a:p>
+            <a:endParaRPr lang="en-US"/>
+          </a:p>
+        </p:txBody>
+      </p:sp>
+      <p:sp>
+        <p:nvSpPr>
+          <p:cNvPr id="3" name="Marcador de contenido 2"/>
+          <p:cNvSpPr>
+            <a:spLocks noGrp="1"/>
+          </p:cNvSpPr>
+          <p:nvPr>
+            <p:ph idx="1"/>
+          </p:nvPr>
+        </p:nvSpPr>
+        <p:spPr/>
+        <p:txBody>
+          <a:bodyPr/>
+          <a:lstStyle/>
+          <a:p>
+            <a:endParaRPr lang="en-US"/>
+          </a:p>
+        </p:txBody>
+      </p:sp>
+      <p:pic>
+        <p:nvPicPr>
+          <p:cNvPr id="4" name="Picture 2"/>
+          <p:cNvPicPr/>
+          <p:nvPr/>
+        </p:nvPicPr>
+        <p:blipFill>
+          <a:blip r:embed="rId2"/>
+          <a:stretch>
+            <a:fillRect/>
+          </a:stretch>
+        </p:blipFill>
+        <p:spPr>
+          <a:xfrm>
+            <a:off x="3124200" y="1577022"/>
+            <a:ext cx="5943600" cy="3703955"/>
+          </a:xfrm>
+          <a:prstGeom prst="rect">
+            <a:avLst/>
+          </a:prstGeom>
+        </p:spPr>
+      </p:pic>
+    </p:spTree>
+    <p:extLst>
+      <p:ext uri="{BB962C8B-B14F-4D97-AF65-F5344CB8AC3E}">
+        <p14:creationId xmlns:p14="http://schemas.microsoft.com/office/powerpoint/2010/main" val="3425669745"/>
+      </p:ext>
+    </p:extLst>
+  </p:cSld>
+  <p:clrMapOvr>
+    <a:masterClrMapping/>
+  </p:clrMapOvr>
+  <p:timing>
+    <p:tnLst>
+      <p:par>
+        <p:cTn id="1" dur="indefinite" restart="never" nodeType="tmRoot"/>
+      </p:par>
+    </p:tnLst>
+  </p:timing>
+</p:sld>
+</file>
+
 <file path=ppt/theme/theme1.xml><?xml version="1.0" encoding="utf-8"?>
 <a:theme xmlns:a="http://schemas.openxmlformats.org/drawingml/2006/main" name="Tema de Office">
   <a:themeElements>

</xml_diff>